<commit_message>
add image and publish documents
</commit_message>
<xml_diff>
--- a/ppt/abcd.pptx
+++ b/ppt/abcd.pptx
@@ -104,6 +104,11 @@
       </a:defRPr>
     </a:lvl9pPr>
   </p:defaultTextStyle>
+  <p:extLst>
+    <p:ext uri="{EFAFB233-063F-42B5-8137-9DF3F51BA10A}">
+      <p15:sldGuideLst xmlns:p15="http://schemas.microsoft.com/office/powerpoint/2012/main"/>
+    </p:ext>
+  </p:extLst>
 </p:presentation>
 </file>
 
@@ -3391,7 +3396,10 @@
           <a:bodyPr/>
           <a:lstStyle/>
           <a:p>
-            <a:endParaRPr lang="en-IN"/>
+            <a:r>
+              <a:rPr lang="en-IN"/>
+              <a:t>eyreryrty</a:t>
+            </a:r>
           </a:p>
         </p:txBody>
       </p:sp>

</xml_diff>